<commit_message>
fix typo, add disclaimer
</commit_message>
<xml_diff>
--- a/pics/11 - BigDataAnalytics - ANDERSON.pptx
+++ b/pics/11 - BigDataAnalytics - ANDERSON.pptx
@@ -5,10 +5,10 @@
     <p:sldMasterId id="2147483658" r:id="rId4"/>
   </p:sldMasterIdLst>
   <p:notesMasterIdLst>
-    <p:notesMasterId r:id="rId35"/>
+    <p:notesMasterId r:id="rId36"/>
   </p:notesMasterIdLst>
   <p:handoutMasterIdLst>
-    <p:handoutMasterId r:id="rId36"/>
+    <p:handoutMasterId r:id="rId37"/>
   </p:handoutMasterIdLst>
   <p:sldIdLst>
     <p:sldId id="437" r:id="rId5"/>
@@ -40,20 +40,21 @@
     <p:sldId id="462" r:id="rId31"/>
     <p:sldId id="463" r:id="rId32"/>
     <p:sldId id="431" r:id="rId33"/>
-    <p:sldId id="287" r:id="rId34"/>
+    <p:sldId id="464" r:id="rId34"/>
+    <p:sldId id="287" r:id="rId35"/>
   </p:sldIdLst>
   <p:sldSz cx="9144000" cy="5143500" type="screen16x9"/>
   <p:notesSz cx="6858000" cy="9144000"/>
   <p:embeddedFontLst>
     <p:embeddedFont>
-      <p:font typeface="Catamaran" pitchFamily="2" charset="77"/>
-      <p:regular r:id="rId37"/>
-      <p:bold r:id="rId38"/>
+      <p:font typeface="Catamaran" panose="020B0604020202020204" charset="0"/>
+      <p:regular r:id="rId38"/>
+      <p:bold r:id="rId39"/>
     </p:embeddedFont>
     <p:embeddedFont>
-      <p:font typeface="Catamaran Thin" pitchFamily="2" charset="77"/>
-      <p:regular r:id="rId39"/>
-      <p:bold r:id="rId40"/>
+      <p:font typeface="Catamaran Thin" panose="020B0604020202020204" charset="0"/>
+      <p:regular r:id="rId40"/>
+      <p:bold r:id="rId41"/>
     </p:embeddedFont>
   </p:embeddedFontLst>
   <p:defaultTextStyle>
@@ -386,7 +387,7 @@
           <a:p>
             <a:fld id="{2FA52922-75C7-42B5-8AC7-D36A1A888AD7}" type="datetimeFigureOut">
               <a:rPr lang="pt-BR" smtClean="0"/>
-              <a:t>13/12/2022</a:t>
+              <a:t>14/12/2022</a:t>
             </a:fld>
             <a:endParaRPr lang="pt-BR"/>
           </a:p>
@@ -11267,6 +11268,482 @@
       </p:grpSpPr>
       <p:sp>
         <p:nvSpPr>
+          <p:cNvPr id="2" name="Title 1">
+            <a:extLst>
+              <a:ext uri="{FF2B5EF4-FFF2-40B4-BE49-F238E27FC236}">
+                <a16:creationId xmlns:a16="http://schemas.microsoft.com/office/drawing/2014/main" id="{A86885BC-0D49-2114-BCD1-F15AE339521E}"/>
+              </a:ext>
+            </a:extLst>
+          </p:cNvPr>
+          <p:cNvSpPr>
+            <a:spLocks noGrp="1"/>
+          </p:cNvSpPr>
+          <p:nvPr>
+            <p:ph type="title"/>
+          </p:nvPr>
+        </p:nvSpPr>
+        <p:spPr/>
+        <p:txBody>
+          <a:bodyPr/>
+          <a:lstStyle/>
+          <a:p>
+            <a:r>
+              <a:rPr lang="pt-BR" dirty="0"/>
+              <a:t>Código-fonte dos experimentos</a:t>
+            </a:r>
+          </a:p>
+        </p:txBody>
+      </p:sp>
+      <p:sp>
+        <p:nvSpPr>
+          <p:cNvPr id="3" name="Text Placeholder 2">
+            <a:extLst>
+              <a:ext uri="{FF2B5EF4-FFF2-40B4-BE49-F238E27FC236}">
+                <a16:creationId xmlns:a16="http://schemas.microsoft.com/office/drawing/2014/main" id="{D817158C-0EE3-0FC3-C071-6803B656A230}"/>
+              </a:ext>
+            </a:extLst>
+          </p:cNvPr>
+          <p:cNvSpPr>
+            <a:spLocks noGrp="1"/>
+          </p:cNvSpPr>
+          <p:nvPr>
+            <p:ph type="body" idx="1"/>
+          </p:nvPr>
+        </p:nvSpPr>
+        <p:spPr>
+          <a:xfrm>
+            <a:off x="1241875" y="1125350"/>
+            <a:ext cx="6660300" cy="1554240"/>
+          </a:xfrm>
+        </p:spPr>
+        <p:txBody>
+          <a:bodyPr/>
+          <a:lstStyle/>
+          <a:p>
+            <a:r>
+              <a:rPr lang="pt-BR" sz="1800" dirty="0"/>
+              <a:t>Código-fonte: </a:t>
+            </a:r>
+            <a:r>
+              <a:rPr lang="pt-BR" sz="1800" dirty="0">
+                <a:hlinkClick r:id="rId2"/>
+              </a:rPr>
+              <a:t>https://github.com/asantos2000/caderno-bd</a:t>
+            </a:r>
+            <a:r>
+              <a:rPr lang="pt-BR" sz="1800" dirty="0"/>
+              <a:t> </a:t>
+            </a:r>
+          </a:p>
+          <a:p>
+            <a:r>
+              <a:rPr lang="pt-BR" sz="1800" dirty="0"/>
+              <a:t>Caderno publicado: </a:t>
+            </a:r>
+            <a:r>
+              <a:rPr lang="pt-BR" sz="1800" b="0" i="0" dirty="0">
+                <a:solidFill>
+                  <a:srgbClr val="C9D1D9"/>
+                </a:solidFill>
+                <a:effectLst/>
+              </a:rPr>
+              <a:t> </a:t>
+            </a:r>
+            <a:r>
+              <a:rPr lang="pt-BR" sz="1800" b="0" i="0" u="none" strike="noStrike" dirty="0">
+                <a:effectLst/>
+                <a:hlinkClick r:id="rId3"/>
+              </a:rPr>
+              <a:t>https://bookdown.org/adsantos/caderno-bd/</a:t>
+            </a:r>
+            <a:endParaRPr lang="pt-BR" sz="1800" dirty="0"/>
+          </a:p>
+        </p:txBody>
+      </p:sp>
+      <p:sp>
+        <p:nvSpPr>
+          <p:cNvPr id="4" name="Slide Number Placeholder 3">
+            <a:extLst>
+              <a:ext uri="{FF2B5EF4-FFF2-40B4-BE49-F238E27FC236}">
+                <a16:creationId xmlns:a16="http://schemas.microsoft.com/office/drawing/2014/main" id="{8B93D821-30D0-E503-F419-382A14ABE2DD}"/>
+              </a:ext>
+            </a:extLst>
+          </p:cNvPr>
+          <p:cNvSpPr>
+            <a:spLocks noGrp="1"/>
+          </p:cNvSpPr>
+          <p:nvPr>
+            <p:ph type="sldNum" idx="12"/>
+          </p:nvPr>
+        </p:nvSpPr>
+        <p:spPr/>
+        <p:txBody>
+          <a:bodyPr/>
+          <a:lstStyle/>
+          <a:p>
+            <a:fld id="{00000000-1234-1234-1234-123412341234}" type="slidenum">
+              <a:rPr lang="en" smtClean="0"/>
+              <a:pPr/>
+              <a:t>30</a:t>
+            </a:fld>
+            <a:endParaRPr lang="en"/>
+          </a:p>
+        </p:txBody>
+      </p:sp>
+      <p:sp>
+        <p:nvSpPr>
+          <p:cNvPr id="5" name="Text Placeholder 2">
+            <a:extLst>
+              <a:ext uri="{FF2B5EF4-FFF2-40B4-BE49-F238E27FC236}">
+                <a16:creationId xmlns:a16="http://schemas.microsoft.com/office/drawing/2014/main" id="{891AE5A7-C34A-3AAA-B792-EF932126D63D}"/>
+              </a:ext>
+            </a:extLst>
+          </p:cNvPr>
+          <p:cNvSpPr txBox="1">
+            <a:spLocks/>
+          </p:cNvSpPr>
+          <p:nvPr/>
+        </p:nvSpPr>
+        <p:spPr>
+          <a:xfrm>
+            <a:off x="1241875" y="2868836"/>
+            <a:ext cx="6660300" cy="1554240"/>
+          </a:xfrm>
+          <a:prstGeom prst="rect">
+            <a:avLst/>
+          </a:prstGeom>
+          <a:noFill/>
+          <a:ln>
+            <a:noFill/>
+          </a:ln>
+        </p:spPr>
+        <p:txBody>
+          <a:bodyPr spcFirstLastPara="1" wrap="square" lIns="0" tIns="0" rIns="0" bIns="0" anchor="t" anchorCtr="0">
+            <a:noAutofit/>
+          </a:bodyPr>
+          <a:lstStyle>
+            <a:defPPr marR="0" lvl="0" algn="l" rtl="0">
+              <a:lnSpc>
+                <a:spcPct val="100000"/>
+              </a:lnSpc>
+              <a:spcBef>
+                <a:spcPts val="0"/>
+              </a:spcBef>
+              <a:spcAft>
+                <a:spcPts val="0"/>
+              </a:spcAft>
+            </a:defPPr>
+            <a:lvl1pPr marL="457200" marR="0" lvl="0" indent="-381000" algn="l" rtl="0">
+              <a:lnSpc>
+                <a:spcPct val="115000"/>
+              </a:lnSpc>
+              <a:spcBef>
+                <a:spcPts val="0"/>
+              </a:spcBef>
+              <a:spcAft>
+                <a:spcPts val="0"/>
+              </a:spcAft>
+              <a:buClr>
+                <a:schemeClr val="accent1"/>
+              </a:buClr>
+              <a:buSzPts val="2400"/>
+              <a:buFont typeface="Catamaran Thin"/>
+              <a:buChar char="▹"/>
+              <a:defRPr sz="2400" b="0" i="0" u="none" strike="noStrike" cap="none">
+                <a:solidFill>
+                  <a:schemeClr val="dk1"/>
+                </a:solidFill>
+                <a:latin typeface="+mj-lt"/>
+                <a:ea typeface="Catamaran Thin"/>
+                <a:cs typeface="Arial" panose="020B0604020202020204" pitchFamily="34" charset="0"/>
+                <a:sym typeface="Catamaran Thin"/>
+              </a:defRPr>
+            </a:lvl1pPr>
+            <a:lvl2pPr marL="914400" marR="0" lvl="1" indent="-381000" algn="l" rtl="0">
+              <a:lnSpc>
+                <a:spcPct val="115000"/>
+              </a:lnSpc>
+              <a:spcBef>
+                <a:spcPts val="800"/>
+              </a:spcBef>
+              <a:spcAft>
+                <a:spcPts val="0"/>
+              </a:spcAft>
+              <a:buClr>
+                <a:schemeClr val="accent1"/>
+              </a:buClr>
+              <a:buSzPts val="2400"/>
+              <a:buFont typeface="Catamaran Thin"/>
+              <a:buChar char="▸"/>
+              <a:defRPr sz="2400" b="0" i="0" u="none" strike="noStrike" cap="none">
+                <a:solidFill>
+                  <a:schemeClr val="dk1"/>
+                </a:solidFill>
+                <a:latin typeface="Catamaran Thin"/>
+                <a:ea typeface="Catamaran Thin"/>
+                <a:cs typeface="Catamaran Thin"/>
+                <a:sym typeface="Catamaran Thin"/>
+              </a:defRPr>
+            </a:lvl2pPr>
+            <a:lvl3pPr marL="1371600" marR="0" lvl="2" indent="-381000" algn="l" rtl="0">
+              <a:lnSpc>
+                <a:spcPct val="115000"/>
+              </a:lnSpc>
+              <a:spcBef>
+                <a:spcPts val="800"/>
+              </a:spcBef>
+              <a:spcAft>
+                <a:spcPts val="0"/>
+              </a:spcAft>
+              <a:buClr>
+                <a:schemeClr val="accent1"/>
+              </a:buClr>
+              <a:buSzPts val="2400"/>
+              <a:buFont typeface="Catamaran Thin"/>
+              <a:buChar char="■"/>
+              <a:defRPr sz="2400" b="0" i="0" u="none" strike="noStrike" cap="none">
+                <a:solidFill>
+                  <a:schemeClr val="dk1"/>
+                </a:solidFill>
+                <a:latin typeface="Catamaran Thin"/>
+                <a:ea typeface="Catamaran Thin"/>
+                <a:cs typeface="Catamaran Thin"/>
+                <a:sym typeface="Catamaran Thin"/>
+              </a:defRPr>
+            </a:lvl3pPr>
+            <a:lvl4pPr marL="1828800" marR="0" lvl="3" indent="-381000" algn="l" rtl="0">
+              <a:lnSpc>
+                <a:spcPct val="115000"/>
+              </a:lnSpc>
+              <a:spcBef>
+                <a:spcPts val="800"/>
+              </a:spcBef>
+              <a:spcAft>
+                <a:spcPts val="0"/>
+              </a:spcAft>
+              <a:buClr>
+                <a:schemeClr val="dk1"/>
+              </a:buClr>
+              <a:buSzPts val="2400"/>
+              <a:buFont typeface="Catamaran Thin"/>
+              <a:buChar char="●"/>
+              <a:defRPr sz="2400" b="0" i="0" u="none" strike="noStrike" cap="none">
+                <a:solidFill>
+                  <a:schemeClr val="dk1"/>
+                </a:solidFill>
+                <a:latin typeface="Catamaran Thin"/>
+                <a:ea typeface="Catamaran Thin"/>
+                <a:cs typeface="Catamaran Thin"/>
+                <a:sym typeface="Catamaran Thin"/>
+              </a:defRPr>
+            </a:lvl4pPr>
+            <a:lvl5pPr marL="2286000" marR="0" lvl="4" indent="-381000" algn="l" rtl="0">
+              <a:lnSpc>
+                <a:spcPct val="115000"/>
+              </a:lnSpc>
+              <a:spcBef>
+                <a:spcPts val="800"/>
+              </a:spcBef>
+              <a:spcAft>
+                <a:spcPts val="0"/>
+              </a:spcAft>
+              <a:buClr>
+                <a:schemeClr val="dk1"/>
+              </a:buClr>
+              <a:buSzPts val="2400"/>
+              <a:buFont typeface="Catamaran Thin"/>
+              <a:buChar char="○"/>
+              <a:defRPr sz="2400" b="0" i="0" u="none" strike="noStrike" cap="none">
+                <a:solidFill>
+                  <a:schemeClr val="dk1"/>
+                </a:solidFill>
+                <a:latin typeface="Catamaran Thin"/>
+                <a:ea typeface="Catamaran Thin"/>
+                <a:cs typeface="Catamaran Thin"/>
+                <a:sym typeface="Catamaran Thin"/>
+              </a:defRPr>
+            </a:lvl5pPr>
+            <a:lvl6pPr marL="2743200" marR="0" lvl="5" indent="-381000" algn="l" rtl="0">
+              <a:lnSpc>
+                <a:spcPct val="115000"/>
+              </a:lnSpc>
+              <a:spcBef>
+                <a:spcPts val="800"/>
+              </a:spcBef>
+              <a:spcAft>
+                <a:spcPts val="0"/>
+              </a:spcAft>
+              <a:buClr>
+                <a:schemeClr val="dk1"/>
+              </a:buClr>
+              <a:buSzPts val="2400"/>
+              <a:buFont typeface="Catamaran Thin"/>
+              <a:buChar char="■"/>
+              <a:defRPr sz="2400" b="0" i="0" u="none" strike="noStrike" cap="none">
+                <a:solidFill>
+                  <a:schemeClr val="dk1"/>
+                </a:solidFill>
+                <a:latin typeface="Catamaran Thin"/>
+                <a:ea typeface="Catamaran Thin"/>
+                <a:cs typeface="Catamaran Thin"/>
+                <a:sym typeface="Catamaran Thin"/>
+              </a:defRPr>
+            </a:lvl6pPr>
+            <a:lvl7pPr marL="3200400" marR="0" lvl="6" indent="-381000" algn="l" rtl="0">
+              <a:lnSpc>
+                <a:spcPct val="115000"/>
+              </a:lnSpc>
+              <a:spcBef>
+                <a:spcPts val="800"/>
+              </a:spcBef>
+              <a:spcAft>
+                <a:spcPts val="0"/>
+              </a:spcAft>
+              <a:buClr>
+                <a:schemeClr val="dk1"/>
+              </a:buClr>
+              <a:buSzPts val="2400"/>
+              <a:buFont typeface="Catamaran Thin"/>
+              <a:buChar char="●"/>
+              <a:defRPr sz="2400" b="0" i="0" u="none" strike="noStrike" cap="none">
+                <a:solidFill>
+                  <a:schemeClr val="dk1"/>
+                </a:solidFill>
+                <a:latin typeface="Catamaran Thin"/>
+                <a:ea typeface="Catamaran Thin"/>
+                <a:cs typeface="Catamaran Thin"/>
+                <a:sym typeface="Catamaran Thin"/>
+              </a:defRPr>
+            </a:lvl7pPr>
+            <a:lvl8pPr marL="3657600" marR="0" lvl="7" indent="-381000" algn="l" rtl="0">
+              <a:lnSpc>
+                <a:spcPct val="115000"/>
+              </a:lnSpc>
+              <a:spcBef>
+                <a:spcPts val="800"/>
+              </a:spcBef>
+              <a:spcAft>
+                <a:spcPts val="0"/>
+              </a:spcAft>
+              <a:buClr>
+                <a:schemeClr val="dk1"/>
+              </a:buClr>
+              <a:buSzPts val="2400"/>
+              <a:buFont typeface="Catamaran Thin"/>
+              <a:buChar char="○"/>
+              <a:defRPr sz="2400" b="0" i="0" u="none" strike="noStrike" cap="none">
+                <a:solidFill>
+                  <a:schemeClr val="dk1"/>
+                </a:solidFill>
+                <a:latin typeface="Catamaran Thin"/>
+                <a:ea typeface="Catamaran Thin"/>
+                <a:cs typeface="Catamaran Thin"/>
+                <a:sym typeface="Catamaran Thin"/>
+              </a:defRPr>
+            </a:lvl8pPr>
+            <a:lvl9pPr marL="4114800" marR="0" lvl="8" indent="-381000" algn="l" rtl="0">
+              <a:lnSpc>
+                <a:spcPct val="115000"/>
+              </a:lnSpc>
+              <a:spcBef>
+                <a:spcPts val="800"/>
+              </a:spcBef>
+              <a:spcAft>
+                <a:spcPts val="800"/>
+              </a:spcAft>
+              <a:buClr>
+                <a:schemeClr val="dk1"/>
+              </a:buClr>
+              <a:buSzPts val="2400"/>
+              <a:buFont typeface="Catamaran Thin"/>
+              <a:buChar char="■"/>
+              <a:defRPr sz="2400" b="0" i="0" u="none" strike="noStrike" cap="none">
+                <a:solidFill>
+                  <a:schemeClr val="dk1"/>
+                </a:solidFill>
+                <a:latin typeface="Catamaran Thin"/>
+                <a:ea typeface="Catamaran Thin"/>
+                <a:cs typeface="Catamaran Thin"/>
+                <a:sym typeface="Catamaran Thin"/>
+              </a:defRPr>
+            </a:lvl9pPr>
+          </a:lstStyle>
+          <a:p>
+            <a:pPr marL="76200" indent="0">
+              <a:buNone/>
+            </a:pPr>
+            <a:r>
+              <a:rPr lang="pt-BR" sz="1400" dirty="0"/>
+              <a:t>Isenção de responsabilidade</a:t>
+            </a:r>
+          </a:p>
+          <a:p>
+            <a:pPr marL="76200" indent="0">
+              <a:buNone/>
+            </a:pPr>
+            <a:endParaRPr lang="pt-BR" sz="1400" dirty="0"/>
+          </a:p>
+          <a:p>
+            <a:pPr marL="76200" indent="0">
+              <a:buNone/>
+            </a:pPr>
+            <a:r>
+              <a:rPr lang="pt-BR" sz="1400" dirty="0"/>
+              <a:t>Todas as informações e dados pertencem aos seus respectivos donos.</a:t>
+            </a:r>
+          </a:p>
+          <a:p>
+            <a:pPr marL="76200" indent="0">
+              <a:buNone/>
+            </a:pPr>
+            <a:r>
+              <a:rPr lang="pt-BR" sz="1400" dirty="0"/>
+              <a:t>Trabalho exclusivamente para fins acadêmicos.</a:t>
+            </a:r>
+          </a:p>
+          <a:p>
+            <a:pPr marL="76200" indent="0">
+              <a:buNone/>
+            </a:pPr>
+            <a:r>
+              <a:rPr lang="pt-BR" sz="1400" dirty="0"/>
+              <a:t>As informações expressas neste trabalho são de opinião exclusiva do autor.</a:t>
+            </a:r>
+          </a:p>
+        </p:txBody>
+      </p:sp>
+    </p:spTree>
+    <p:extLst>
+      <p:ext uri="{BB962C8B-B14F-4D97-AF65-F5344CB8AC3E}">
+        <p14:creationId xmlns:p14="http://schemas.microsoft.com/office/powerpoint/2010/main" val="2400734519"/>
+      </p:ext>
+    </p:extLst>
+  </p:cSld>
+  <p:clrMapOvr>
+    <a:masterClrMapping/>
+  </p:clrMapOvr>
+</p:sld>
+</file>
+
+<file path=ppt/slides/slide31.xml><?xml version="1.0" encoding="utf-8"?>
+<p:sld xmlns:a="http://schemas.openxmlformats.org/drawingml/2006/main" xmlns:r="http://schemas.openxmlformats.org/officeDocument/2006/relationships" xmlns:p="http://schemas.openxmlformats.org/presentationml/2006/main">
+  <p:cSld>
+    <p:spTree>
+      <p:nvGrpSpPr>
+        <p:cNvPr id="1" name=""/>
+        <p:cNvGrpSpPr/>
+        <p:nvPr/>
+      </p:nvGrpSpPr>
+      <p:grpSpPr>
+        <a:xfrm>
+          <a:off x="0" y="0"/>
+          <a:ext cx="0" cy="0"/>
+          <a:chOff x="0" y="0"/>
+          <a:chExt cx="0" cy="0"/>
+        </a:xfrm>
+      </p:grpSpPr>
+      <p:sp>
+        <p:nvSpPr>
           <p:cNvPr id="3" name="Espaço Reservado para Número de Slide 2"/>
           <p:cNvSpPr>
             <a:spLocks noGrp="1"/>
@@ -11291,7 +11768,7 @@
             </a:pPr>
             <a:fld id="{00000000-1234-1234-1234-123412341234}" type="slidenum">
               <a:rPr lang="pt-BR" smtClean="0"/>
-              <a:t>30</a:t>
+              <a:t>31</a:t>
             </a:fld>
             <a:endParaRPr lang="pt-BR"/>
           </a:p>
@@ -13156,18 +13633,18 @@
 </file>
 
 <file path=customXml/item1.xml><?xml version="1.0" encoding="utf-8"?>
-<p:properties xmlns:p="http://schemas.microsoft.com/office/2006/metadata/properties" xmlns:xsi="http://www.w3.org/2001/XMLSchema-instance" xmlns:pc="http://schemas.microsoft.com/office/infopath/2007/PartnerControls">
-  <documentManagement/>
-</p:properties>
-</file>
-
-<file path=customXml/item2.xml><?xml version="1.0" encoding="utf-8"?>
 <?mso-contentType ?>
 <FormTemplates xmlns="http://schemas.microsoft.com/sharepoint/v3/contenttype/forms">
   <Display>DocumentLibraryForm</Display>
   <Edit>DocumentLibraryForm</Edit>
   <New>DocumentLibraryForm</New>
 </FormTemplates>
+</file>
+
+<file path=customXml/item2.xml><?xml version="1.0" encoding="utf-8"?>
+<p:properties xmlns:p="http://schemas.microsoft.com/office/2006/metadata/properties" xmlns:xsi="http://www.w3.org/2001/XMLSchema-instance" xmlns:pc="http://schemas.microsoft.com/office/infopath/2007/PartnerControls">
+  <documentManagement/>
+</p:properties>
 </file>
 
 <file path=customXml/item3.xml><?xml version="1.0" encoding="utf-8"?>
@@ -13400,6 +13877,14 @@
 </file>
 
 <file path=customXml/itemProps1.xml><?xml version="1.0" encoding="utf-8"?>
+<ds:datastoreItem xmlns:ds="http://schemas.openxmlformats.org/officeDocument/2006/customXml" ds:itemID="{6987CAC9-BC8E-4BF3-A1E6-2EBB0D93A86D}">
+  <ds:schemaRefs>
+    <ds:schemaRef ds:uri="http://schemas.microsoft.com/sharepoint/v3/contenttype/forms"/>
+  </ds:schemaRefs>
+</ds:datastoreItem>
+</file>
+
+<file path=customXml/itemProps2.xml><?xml version="1.0" encoding="utf-8"?>
 <ds:datastoreItem xmlns:ds="http://schemas.openxmlformats.org/officeDocument/2006/customXml" ds:itemID="{10ABDFD6-8FB0-401E-9356-C03F6DB31998}">
   <ds:schemaRefs>
     <ds:schemaRef ds:uri="http://purl.org/dc/terms/"/>
@@ -13412,14 +13897,6 @@
     <ds:schemaRef ds:uri="http://schemas.microsoft.com/office/infopath/2007/PartnerControls"/>
     <ds:schemaRef ds:uri="65a0ad0d-aef6-4631-9e8a-63032fe3eb72"/>
     <ds:schemaRef ds:uri="http://schemas.microsoft.com/office/2006/metadata/properties"/>
-  </ds:schemaRefs>
-</ds:datastoreItem>
-</file>
-
-<file path=customXml/itemProps2.xml><?xml version="1.0" encoding="utf-8"?>
-<ds:datastoreItem xmlns:ds="http://schemas.openxmlformats.org/officeDocument/2006/customXml" ds:itemID="{6987CAC9-BC8E-4BF3-A1E6-2EBB0D93A86D}">
-  <ds:schemaRefs>
-    <ds:schemaRef ds:uri="http://schemas.microsoft.com/sharepoint/v3/contenttype/forms"/>
   </ds:schemaRefs>
 </ds:datastoreItem>
 </file>

</xml_diff>